<commit_message>
Fixed typos, added example
</commit_message>
<xml_diff>
--- a/Python/python_development_practices.pptx
+++ b/Python/python_development_practices.pptx
@@ -207,7 +207,7 @@
           <a:p>
             <a:fld id="{03DC287A-34DE-4461-AD1D-9F5D19819D26}" type="datetimeFigureOut">
               <a:rPr lang="en-US" smtClean="0"/>
-              <a:t>2016-06-03</a:t>
+              <a:t>2017-04-13</a:t>
             </a:fld>
             <a:endParaRPr lang="en-US"/>
           </a:p>
@@ -861,7 +861,7 @@
           <a:p>
             <a:fld id="{2B3CC443-572D-4CF3-967C-F4B193BF6B17}" type="datetimeFigureOut">
               <a:rPr lang="en-US" smtClean="0"/>
-              <a:t>2016-06-03</a:t>
+              <a:t>2017-04-13</a:t>
             </a:fld>
             <a:endParaRPr lang="en-US"/>
           </a:p>
@@ -1031,7 +1031,7 @@
           <a:p>
             <a:fld id="{2B3CC443-572D-4CF3-967C-F4B193BF6B17}" type="datetimeFigureOut">
               <a:rPr lang="en-US" smtClean="0"/>
-              <a:t>2016-06-03</a:t>
+              <a:t>2017-04-13</a:t>
             </a:fld>
             <a:endParaRPr lang="en-US"/>
           </a:p>
@@ -1211,7 +1211,7 @@
           <a:p>
             <a:fld id="{2B3CC443-572D-4CF3-967C-F4B193BF6B17}" type="datetimeFigureOut">
               <a:rPr lang="en-US" smtClean="0"/>
-              <a:t>2016-06-03</a:t>
+              <a:t>2017-04-13</a:t>
             </a:fld>
             <a:endParaRPr lang="en-US"/>
           </a:p>
@@ -1381,7 +1381,7 @@
           <a:p>
             <a:fld id="{2B3CC443-572D-4CF3-967C-F4B193BF6B17}" type="datetimeFigureOut">
               <a:rPr lang="en-US" smtClean="0"/>
-              <a:t>2016-06-03</a:t>
+              <a:t>2017-04-13</a:t>
             </a:fld>
             <a:endParaRPr lang="en-US"/>
           </a:p>
@@ -1625,7 +1625,7 @@
           <a:p>
             <a:fld id="{2B3CC443-572D-4CF3-967C-F4B193BF6B17}" type="datetimeFigureOut">
               <a:rPr lang="en-US" smtClean="0"/>
-              <a:t>2016-06-03</a:t>
+              <a:t>2017-04-13</a:t>
             </a:fld>
             <a:endParaRPr lang="en-US"/>
           </a:p>
@@ -1857,7 +1857,7 @@
           <a:p>
             <a:fld id="{2B3CC443-572D-4CF3-967C-F4B193BF6B17}" type="datetimeFigureOut">
               <a:rPr lang="en-US" smtClean="0"/>
-              <a:t>2016-06-03</a:t>
+              <a:t>2017-04-13</a:t>
             </a:fld>
             <a:endParaRPr lang="en-US"/>
           </a:p>
@@ -2224,7 +2224,7 @@
           <a:p>
             <a:fld id="{2B3CC443-572D-4CF3-967C-F4B193BF6B17}" type="datetimeFigureOut">
               <a:rPr lang="en-US" smtClean="0"/>
-              <a:t>2016-06-03</a:t>
+              <a:t>2017-04-13</a:t>
             </a:fld>
             <a:endParaRPr lang="en-US"/>
           </a:p>
@@ -2342,7 +2342,7 @@
           <a:p>
             <a:fld id="{2B3CC443-572D-4CF3-967C-F4B193BF6B17}" type="datetimeFigureOut">
               <a:rPr lang="en-US" smtClean="0"/>
-              <a:t>2016-06-03</a:t>
+              <a:t>2017-04-13</a:t>
             </a:fld>
             <a:endParaRPr lang="en-US"/>
           </a:p>
@@ -2437,7 +2437,7 @@
           <a:p>
             <a:fld id="{2B3CC443-572D-4CF3-967C-F4B193BF6B17}" type="datetimeFigureOut">
               <a:rPr lang="en-US" smtClean="0"/>
-              <a:t>2016-06-03</a:t>
+              <a:t>2017-04-13</a:t>
             </a:fld>
             <a:endParaRPr lang="en-US"/>
           </a:p>
@@ -2714,7 +2714,7 @@
           <a:p>
             <a:fld id="{2B3CC443-572D-4CF3-967C-F4B193BF6B17}" type="datetimeFigureOut">
               <a:rPr lang="en-US" smtClean="0"/>
-              <a:t>2016-06-03</a:t>
+              <a:t>2017-04-13</a:t>
             </a:fld>
             <a:endParaRPr lang="en-US"/>
           </a:p>
@@ -2971,7 +2971,7 @@
           <a:p>
             <a:fld id="{2B3CC443-572D-4CF3-967C-F4B193BF6B17}" type="datetimeFigureOut">
               <a:rPr lang="en-US" smtClean="0"/>
-              <a:t>2016-06-03</a:t>
+              <a:t>2017-04-13</a:t>
             </a:fld>
             <a:endParaRPr lang="en-US"/>
           </a:p>
@@ -3184,7 +3184,7 @@
           <a:p>
             <a:fld id="{2B3CC443-572D-4CF3-967C-F4B193BF6B17}" type="datetimeFigureOut">
               <a:rPr lang="en-US" smtClean="0"/>
-              <a:t>2016-06-03</a:t>
+              <a:t>2017-04-13</a:t>
             </a:fld>
             <a:endParaRPr lang="en-US"/>
           </a:p>
@@ -5654,7 +5654,7 @@
             <a:graphicData uri="http://schemas.openxmlformats.org/presentationml/2006/ole">
               <mc:AlternateContent xmlns:mc="http://schemas.openxmlformats.org/markup-compatibility/2006">
                 <mc:Choice xmlns:v="urn:schemas-microsoft-com:vml" Requires="v">
-                  <p:oleObj spid="_x0000_s1040" name="Equation" r:id="rId4" imgW="1320227" imgH="710891" progId="Equation.3">
+                  <p:oleObj spid="_x0000_s1042" name="Equation" r:id="rId4" imgW="1320227" imgH="710891" progId="Equation.3">
                     <p:embed/>
                   </p:oleObj>
                 </mc:Choice>
@@ -6869,7 +6869,11 @@
           <a:p>
             <a:r>
               <a:rPr lang="en-US" dirty="0" smtClean="0"/>
-              <a:t>Comment &amp; documentation</a:t>
+              <a:t>Comments </a:t>
+            </a:r>
+            <a:r>
+              <a:rPr lang="en-US" dirty="0" smtClean="0"/>
+              <a:t>&amp; documentation</a:t>
             </a:r>
           </a:p>
           <a:p>
@@ -7336,7 +7340,7 @@
         <p:spPr>
           <a:xfrm>
             <a:off x="936170" y="4931225"/>
-            <a:ext cx="5561138" cy="1200329"/>
+            <a:ext cx="5561138" cy="1477328"/>
           </a:xfrm>
           <a:prstGeom prst="rect">
             <a:avLst/>
@@ -7451,7 +7455,14 @@
                 <a:latin typeface="Courier New" panose="02070309020205020404" pitchFamily="49" charset="0"/>
                 <a:cs typeface="Courier New" panose="02070309020205020404" pitchFamily="49" charset="0"/>
               </a:rPr>
-              <a:t>(line)</a:t>
+              <a:t>(line</a:t>
+            </a:r>
+            <a:r>
+              <a:rPr lang="en-US" dirty="0" smtClean="0">
+                <a:latin typeface="Courier New" panose="02070309020205020404" pitchFamily="49" charset="0"/>
+                <a:cs typeface="Courier New" panose="02070309020205020404" pitchFamily="49" charset="0"/>
+              </a:rPr>
+              <a:t>)</a:t>
             </a:r>
           </a:p>
           <a:p>
@@ -7467,7 +7478,34 @@
                 <a:latin typeface="Courier New" panose="02070309020205020404" pitchFamily="49" charset="0"/>
                 <a:cs typeface="Courier New" panose="02070309020205020404" pitchFamily="49" charset="0"/>
               </a:rPr>
-              <a:t>       </a:t>
+              <a:t>       if </a:t>
+            </a:r>
+            <a:r>
+              <a:rPr lang="en-US" dirty="0" err="1" smtClean="0">
+                <a:latin typeface="Courier New" panose="02070309020205020404" pitchFamily="49" charset="0"/>
+                <a:cs typeface="Courier New" panose="02070309020205020404" pitchFamily="49" charset="0"/>
+              </a:rPr>
+              <a:t>is_valid</a:t>
+            </a:r>
+            <a:r>
+              <a:rPr lang="en-US" dirty="0" smtClean="0">
+                <a:latin typeface="Courier New" panose="02070309020205020404" pitchFamily="49" charset="0"/>
+                <a:cs typeface="Courier New" panose="02070309020205020404" pitchFamily="49" charset="0"/>
+              </a:rPr>
+              <a:t>(data):</a:t>
+            </a:r>
+            <a:endParaRPr lang="en-US" dirty="0" smtClean="0">
+              <a:latin typeface="Courier New" panose="02070309020205020404" pitchFamily="49" charset="0"/>
+              <a:cs typeface="Courier New" panose="02070309020205020404" pitchFamily="49" charset="0"/>
+            </a:endParaRPr>
+          </a:p>
+          <a:p>
+            <a:r>
+              <a:rPr lang="en-US" dirty="0" smtClean="0">
+                <a:latin typeface="Courier New" panose="02070309020205020404" pitchFamily="49" charset="0"/>
+                <a:cs typeface="Courier New" panose="02070309020205020404" pitchFamily="49" charset="0"/>
+              </a:rPr>
+              <a:t>            </a:t>
             </a:r>
             <a:r>
               <a:rPr lang="en-US" dirty="0" err="1" smtClean="0">
@@ -8016,8 +8054,13 @@
             <a:pPr lvl="1"/>
             <a:r>
               <a:rPr lang="en-US" dirty="0" smtClean="0"/>
-              <a:t>no longer than fits on monitor</a:t>
-            </a:r>
+              <a:t>no longer than fits on </a:t>
+            </a:r>
+            <a:r>
+              <a:rPr lang="en-US" dirty="0" smtClean="0"/>
+              <a:t>screen</a:t>
+            </a:r>
+            <a:endParaRPr lang="en-US" dirty="0" smtClean="0"/>
           </a:p>
           <a:p>
             <a:pPr lvl="1"/>
@@ -8033,8 +8076,13 @@
             </a:r>
             <a:r>
               <a:rPr lang="en-US" dirty="0" smtClean="0"/>
-              <a:t> code length</a:t>
-            </a:r>
+              <a:t> code </a:t>
+            </a:r>
+            <a:r>
+              <a:rPr lang="en-US" dirty="0" smtClean="0"/>
+              <a:t>length!</a:t>
+            </a:r>
+            <a:endParaRPr lang="en-US" dirty="0" smtClean="0"/>
           </a:p>
           <a:p>
             <a:r>
@@ -8976,13 +9024,10 @@
           </a:p>
           <a:p>
             <a:r>
-              <a:rPr lang="en-US" dirty="0" err="1" smtClean="0"/>
-              <a:t>E.g</a:t>
-            </a:r>
-            <a:r>
               <a:rPr lang="en-US" dirty="0" smtClean="0"/>
-              <a:t>,</a:t>
-            </a:r>
+              <a:t>E.g.,</a:t>
+            </a:r>
+            <a:endParaRPr lang="en-US" dirty="0" smtClean="0"/>
           </a:p>
           <a:p>
             <a:pPr lvl="1"/>

</xml_diff>